<commit_message>
Added my champion and updated my part of the presentation
</commit_message>
<xml_diff>
--- a/Documents/SA Presentation.pptx
+++ b/Documents/SA Presentation.pptx
@@ -148,12 +148,12 @@
     <p1510:client id="{DFB90EFC-D1AC-A6F8-C9D6-AEAD7E96EA65}" v="178" dt="2019-02-06T06:34:22.590"/>
     <p1510:client id="{C7950789-276C-0A0F-7C85-95412B85975B}" v="499" dt="2019-02-06T06:52:49.757"/>
     <p1510:client id="{EC51EA77-BFB9-9D0B-4590-7407895338F1}" v="13" dt="2019-02-06T18:16:29.468"/>
+    <p1510:client id="{082CB375-B14E-00BB-B475-0102444B9B54}" v="4" dt="2019-02-07T03:11:16.690"/>
     <p1510:client id="{11F8D6B3-99A4-385F-E31E-443DA330B3D2}" v="954" dt="2019-02-06T18:47:10.573"/>
+    <p1510:client id="{A06E8E80-71DC-5566-7F25-FB40F4D805F2}" v="344" dt="2019-02-06T18:25:56.423"/>
+    <p1510:client id="{B93454F7-E4D7-680C-27DB-96A3AA6FB4B6}" v="132" dt="2019-02-06T21:45:20.231"/>
     <p1510:client id="{47EB2AF2-69E9-D9C5-B286-63813D6AAF0A}" v="247" dt="2019-02-06T21:47:11.022"/>
     <p1510:client id="{ED5EFD56-9E27-185B-5892-BF327F11B68F}" v="1" dt="2019-02-06T21:48:11.872"/>
-    <p1510:client id="{B93454F7-E4D7-680C-27DB-96A3AA6FB4B6}" v="132" dt="2019-02-06T21:45:20.231"/>
-    <p1510:client id="{A06E8E80-71DC-5566-7F25-FB40F4D805F2}" v="344" dt="2019-02-06T18:25:56.423"/>
-    <p1510:client id="{082CB375-B14E-00BB-B475-0102444B9B54}" v="4" dt="2019-02-07T03:11:16.690"/>
   </p1510:revLst>
 </p1510:revInfo>
 </file>
@@ -658,7 +658,7 @@
           <a:p>
             <a:fld id="{846CE7D5-CF57-46EF-B807-FDD0502418D4}" type="datetimeFigureOut">
               <a:rPr lang="en-US" smtClean="0"/>
-              <a:t>2/6/2019</a:t>
+              <a:t>2/7/2019</a:t>
             </a:fld>
             <a:endParaRPr lang="en-US"/>
           </a:p>
@@ -952,7 +952,7 @@
           <a:p>
             <a:fld id="{846CE7D5-CF57-46EF-B807-FDD0502418D4}" type="datetimeFigureOut">
               <a:rPr lang="en-US" smtClean="0"/>
-              <a:t>2/6/2019</a:t>
+              <a:t>2/7/2019</a:t>
             </a:fld>
             <a:endParaRPr lang="en-US"/>
           </a:p>
@@ -1199,7 +1199,7 @@
           <a:p>
             <a:fld id="{846CE7D5-CF57-46EF-B807-FDD0502418D4}" type="datetimeFigureOut">
               <a:rPr lang="en-US" smtClean="0"/>
-              <a:t>2/6/2019</a:t>
+              <a:t>2/7/2019</a:t>
             </a:fld>
             <a:endParaRPr lang="en-US"/>
           </a:p>
@@ -1738,7 +1738,7 @@
           <a:p>
             <a:fld id="{846CE7D5-CF57-46EF-B807-FDD0502418D4}" type="datetimeFigureOut">
               <a:rPr lang="en-US" smtClean="0"/>
-              <a:t>2/6/2019</a:t>
+              <a:t>2/7/2019</a:t>
             </a:fld>
             <a:endParaRPr lang="en-US"/>
           </a:p>
@@ -1985,7 +1985,7 @@
           <a:p>
             <a:fld id="{846CE7D5-CF57-46EF-B807-FDD0502418D4}" type="datetimeFigureOut">
               <a:rPr lang="en-US" smtClean="0"/>
-              <a:t>2/6/2019</a:t>
+              <a:t>2/7/2019</a:t>
             </a:fld>
             <a:endParaRPr lang="en-US"/>
           </a:p>
@@ -2516,7 +2516,7 @@
           <a:p>
             <a:fld id="{846CE7D5-CF57-46EF-B807-FDD0502418D4}" type="datetimeFigureOut">
               <a:rPr lang="en-US" smtClean="0"/>
-              <a:t>2/6/2019</a:t>
+              <a:t>2/7/2019</a:t>
             </a:fld>
             <a:endParaRPr lang="en-US"/>
           </a:p>
@@ -2812,7 +2812,7 @@
           <a:p>
             <a:fld id="{846CE7D5-CF57-46EF-B807-FDD0502418D4}" type="datetimeFigureOut">
               <a:rPr lang="en-US" smtClean="0"/>
-              <a:t>2/6/2019</a:t>
+              <a:t>2/7/2019</a:t>
             </a:fld>
             <a:endParaRPr lang="en-US"/>
           </a:p>
@@ -2984,7 +2984,7 @@
           <a:p>
             <a:fld id="{846CE7D5-CF57-46EF-B807-FDD0502418D4}" type="datetimeFigureOut">
               <a:rPr lang="en-US" smtClean="0"/>
-              <a:t>2/6/2019</a:t>
+              <a:t>2/7/2019</a:t>
             </a:fld>
             <a:endParaRPr lang="en-US"/>
           </a:p>
@@ -3162,7 +3162,7 @@
           <a:p>
             <a:fld id="{846CE7D5-CF57-46EF-B807-FDD0502418D4}" type="datetimeFigureOut">
               <a:rPr lang="en-US" smtClean="0"/>
-              <a:t>2/6/2019</a:t>
+              <a:t>2/7/2019</a:t>
             </a:fld>
             <a:endParaRPr lang="en-US"/>
           </a:p>
@@ -3330,7 +3330,7 @@
           <a:p>
             <a:fld id="{846CE7D5-CF57-46EF-B807-FDD0502418D4}" type="datetimeFigureOut">
               <a:rPr lang="en-US" smtClean="0"/>
-              <a:t>2/6/2019</a:t>
+              <a:t>2/7/2019</a:t>
             </a:fld>
             <a:endParaRPr lang="en-US"/>
           </a:p>
@@ -3580,7 +3580,7 @@
           <a:p>
             <a:fld id="{846CE7D5-CF57-46EF-B807-FDD0502418D4}" type="datetimeFigureOut">
               <a:rPr lang="en-US" smtClean="0"/>
-              <a:t>2/6/2019</a:t>
+              <a:t>2/7/2019</a:t>
             </a:fld>
             <a:endParaRPr lang="en-US"/>
           </a:p>
@@ -3874,7 +3874,7 @@
           <a:p>
             <a:fld id="{846CE7D5-CF57-46EF-B807-FDD0502418D4}" type="datetimeFigureOut">
               <a:rPr lang="en-US" smtClean="0"/>
-              <a:t>2/6/2019</a:t>
+              <a:t>2/7/2019</a:t>
             </a:fld>
             <a:endParaRPr lang="en-US"/>
           </a:p>
@@ -4313,7 +4313,7 @@
           <a:p>
             <a:fld id="{846CE7D5-CF57-46EF-B807-FDD0502418D4}" type="datetimeFigureOut">
               <a:rPr lang="en-US" smtClean="0"/>
-              <a:t>2/6/2019</a:t>
+              <a:t>2/7/2019</a:t>
             </a:fld>
             <a:endParaRPr lang="en-US"/>
           </a:p>
@@ -4430,7 +4430,7 @@
           <a:p>
             <a:fld id="{846CE7D5-CF57-46EF-B807-FDD0502418D4}" type="datetimeFigureOut">
               <a:rPr lang="en-US" smtClean="0"/>
-              <a:t>2/6/2019</a:t>
+              <a:t>2/7/2019</a:t>
             </a:fld>
             <a:endParaRPr lang="en-US"/>
           </a:p>
@@ -4525,7 +4525,7 @@
           <a:p>
             <a:fld id="{846CE7D5-CF57-46EF-B807-FDD0502418D4}" type="datetimeFigureOut">
               <a:rPr lang="en-US" smtClean="0"/>
-              <a:t>2/6/2019</a:t>
+              <a:t>2/7/2019</a:t>
             </a:fld>
             <a:endParaRPr lang="en-US"/>
           </a:p>
@@ -4806,7 +4806,7 @@
           <a:p>
             <a:fld id="{846CE7D5-CF57-46EF-B807-FDD0502418D4}" type="datetimeFigureOut">
               <a:rPr lang="en-US" smtClean="0"/>
-              <a:t>2/6/2019</a:t>
+              <a:t>2/7/2019</a:t>
             </a:fld>
             <a:endParaRPr lang="en-US"/>
           </a:p>
@@ -5095,7 +5095,7 @@
           <a:p>
             <a:fld id="{846CE7D5-CF57-46EF-B807-FDD0502418D4}" type="datetimeFigureOut">
               <a:rPr lang="en-US" smtClean="0"/>
-              <a:t>2/6/2019</a:t>
+              <a:t>2/7/2019</a:t>
             </a:fld>
             <a:endParaRPr lang="en-US"/>
           </a:p>
@@ -5623,7 +5623,7 @@
           <a:p>
             <a:fld id="{846CE7D5-CF57-46EF-B807-FDD0502418D4}" type="datetimeFigureOut">
               <a:rPr lang="en-US" smtClean="0"/>
-              <a:t>2/6/2019</a:t>
+              <a:t>2/7/2019</a:t>
             </a:fld>
             <a:endParaRPr lang="en-US"/>
           </a:p>
@@ -14452,7 +14452,7 @@
           <p:nvPr>
             <p:extLst>
               <p:ext uri="{D42A27DB-BD31-4B8C-83A1-F6EECF244321}">
-                <p14:modId xmlns:p14="http://schemas.microsoft.com/office/powerpoint/2010/main" val="3161421678"/>
+                <p14:modId xmlns:p14="http://schemas.microsoft.com/office/powerpoint/2010/main" val="1962440587"/>
               </p:ext>
             </p:extLst>
           </p:nvPr>
@@ -14520,24 +14520,24 @@
                     <a:p>
                       <a:pPr fontAlgn="base"/>
                       <a:r>
-                        <a:rPr lang="en-US" sz="1400">
+                        <a:rPr lang="en-US" sz="1400" dirty="0">
                           <a:effectLst/>
                         </a:rPr>
                         <a:t>Duration (</a:t>
                       </a:r>
                       <a:r>
-                        <a:rPr lang="en-US" sz="1400" err="1">
+                        <a:rPr lang="en-US" sz="1400" dirty="0" err="1">
                           <a:effectLst/>
                         </a:rPr>
-                        <a:t>PWks</a:t>
-                      </a:r>
-                      <a:r>
-                        <a:rPr lang="en-US" sz="1400">
+                        <a:t>PHrs</a:t>
+                      </a:r>
+                      <a:r>
+                        <a:rPr lang="en-US" sz="1400" dirty="0">
                           <a:effectLst/>
                         </a:rPr>
                         <a:t>)​</a:t>
                       </a:r>
-                      <a:endParaRPr lang="en-US" sz="1400" b="1">
+                      <a:endParaRPr lang="en-US" sz="1400" b="1" dirty="0">
                         <a:solidFill>
                           <a:srgbClr val="FFFFFF"/>
                         </a:solidFill>
@@ -14605,10 +14605,10 @@
                     <a:p>
                       <a:pPr fontAlgn="base"/>
                       <a:r>
-                        <a:rPr lang="en-US" sz="1400">
+                        <a:rPr lang="en-US" sz="1400" dirty="0">
                           <a:effectLst/>
                         </a:rPr>
-                        <a:t>1​</a:t>
+                        <a:t>5</a:t>
                       </a:r>
                     </a:p>
                   </a:txBody>
@@ -14666,10 +14666,10 @@
                     <a:p>
                       <a:pPr fontAlgn="base"/>
                       <a:r>
-                        <a:rPr lang="en-US" sz="1400">
+                        <a:rPr lang="en-US" sz="1400" dirty="0">
                           <a:effectLst/>
                         </a:rPr>
-                        <a:t>2​</a:t>
+                        <a:t>3</a:t>
                       </a:r>
                     </a:p>
                   </a:txBody>
@@ -14704,16 +14704,26 @@
                     <a:lstStyle/>
                     <a:p>
                       <a:r>
-                        <a:rPr lang="en-US" sz="1400">
+                        <a:rPr lang="en-US" sz="1400" dirty="0">
                           <a:effectLst/>
                         </a:rPr>
-                        <a:t>3.  Implement </a:t>
-                      </a:r>
-                      <a:r>
-                        <a:rPr lang="en-US" sz="1400"/>
-                        <a:t>Item/Player/Enemy loading</a:t>
-                      </a:r>
-                      <a:endParaRPr lang="en-US" sz="1400">
+                        <a:t>3.  Implement Bounds Check</a:t>
+                      </a:r>
+                    </a:p>
+                  </a:txBody>
+                  <a:tcPr anchor="ctr"/>
+                </a:tc>
+                <a:tc>
+                  <a:txBody>
+                    <a:bodyPr/>
+                    <a:lstStyle/>
+                    <a:p>
+                      <a:pPr fontAlgn="base"/>
+                      <a:r>
+                        <a:rPr lang="en-US" sz="1400" dirty="0"/>
+                        <a:t>15</a:t>
+                      </a:r>
+                      <a:endParaRPr lang="en-US" sz="1400" dirty="0">
                         <a:effectLst/>
                       </a:endParaRPr>
                     </a:p>
@@ -14727,24 +14737,7 @@
                     <a:p>
                       <a:pPr fontAlgn="base"/>
                       <a:r>
-                        <a:rPr lang="en-US" sz="1400"/>
-                        <a:t>3</a:t>
-                      </a:r>
-                      <a:endParaRPr lang="en-US" sz="1400">
-                        <a:effectLst/>
-                      </a:endParaRPr>
-                    </a:p>
-                  </a:txBody>
-                  <a:tcPr anchor="ctr"/>
-                </a:tc>
-                <a:tc>
-                  <a:txBody>
-                    <a:bodyPr/>
-                    <a:lstStyle/>
-                    <a:p>
-                      <a:pPr fontAlgn="base"/>
-                      <a:r>
-                        <a:rPr lang="en-US" sz="1400">
+                        <a:rPr lang="en-US" sz="1400" dirty="0">
                           <a:effectLst/>
                         </a:rPr>
                         <a:t>2​</a:t>
@@ -14766,20 +14759,20 @@
                     <a:lstStyle/>
                     <a:p>
                       <a:r>
-                        <a:rPr lang="en-US" sz="1400">
+                        <a:rPr lang="en-US" sz="1400" dirty="0">
                           <a:effectLst/>
                         </a:rPr>
-                        <a:t>4.  Implement</a:t>
-                      </a:r>
-                      <a:r>
-                        <a:rPr lang="en-US" sz="1400"/>
-                        <a:t> Bounds </a:t>
-                      </a:r>
-                      <a:r>
-                        <a:rPr lang="en-US" sz="1400">
+                        <a:t>4.  Implement </a:t>
+                      </a:r>
+                      <a:r>
+                        <a:rPr lang="en-US" sz="1400" dirty="0"/>
+                        <a:t>Item/Player/Enemy loading</a:t>
+                      </a:r>
+                      <a:r>
+                        <a:rPr lang="en-US" sz="1400" dirty="0">
                           <a:effectLst/>
                         </a:rPr>
-                        <a:t>Check​</a:t>
+                        <a:t>​</a:t>
                       </a:r>
                     </a:p>
                   </a:txBody>
@@ -14792,10 +14785,10 @@
                     <a:p>
                       <a:pPr fontAlgn="base"/>
                       <a:r>
-                        <a:rPr lang="en-US" sz="1400">
+                        <a:rPr lang="en-US" sz="1400" dirty="0">
                           <a:effectLst/>
                         </a:rPr>
-                        <a:t>2​</a:t>
+                        <a:t>10​</a:t>
                       </a:r>
                     </a:p>
                   </a:txBody>
@@ -14808,10 +14801,10 @@
                     <a:p>
                       <a:pPr fontAlgn="base"/>
                       <a:r>
-                        <a:rPr lang="en-US" sz="1400">
+                        <a:rPr lang="en-US" sz="1400" dirty="0">
                           <a:effectLst/>
                         </a:rPr>
-                        <a:t>3​</a:t>
+                        <a:t>2,3​</a:t>
                       </a:r>
                     </a:p>
                   </a:txBody>
@@ -14856,10 +14849,10 @@
                     <a:p>
                       <a:pPr fontAlgn="base"/>
                       <a:r>
-                        <a:rPr lang="en-US" sz="1400">
+                        <a:rPr lang="en-US" sz="1400" dirty="0">
                           <a:effectLst/>
                         </a:rPr>
-                        <a:t>1​</a:t>
+                        <a:t>2</a:t>
                       </a:r>
                     </a:p>
                   </a:txBody>
@@ -14872,10 +14865,10 @@
                     <a:p>
                       <a:pPr fontAlgn="base"/>
                       <a:r>
-                        <a:rPr lang="en-US" sz="1400">
+                        <a:rPr lang="en-US" sz="1400" dirty="0">
                           <a:effectLst/>
                         </a:rPr>
-                        <a:t>3​</a:t>
+                        <a:t>4</a:t>
                       </a:r>
                     </a:p>
                   </a:txBody>
@@ -14911,10 +14904,10 @@
                     <a:p>
                       <a:pPr fontAlgn="base"/>
                       <a:r>
-                        <a:rPr lang="en-US" sz="1400"/>
+                        <a:rPr lang="en-US" sz="1400" dirty="0"/>
                         <a:t>1</a:t>
                       </a:r>
-                      <a:endParaRPr lang="en-US" sz="1400">
+                      <a:endParaRPr lang="en-US" sz="1400" dirty="0">
                         <a:effectLst/>
                       </a:endParaRPr>
                     </a:p>
@@ -14928,10 +14921,10 @@
                     <a:p>
                       <a:pPr fontAlgn="base"/>
                       <a:r>
-                        <a:rPr lang="en-US" sz="1400"/>
+                        <a:rPr lang="en-US" sz="1400" dirty="0"/>
                         <a:t>2</a:t>
                       </a:r>
-                      <a:endParaRPr lang="en-US" sz="1400">
+                      <a:endParaRPr lang="en-US" sz="1400" dirty="0">
                         <a:effectLst/>
                       </a:endParaRPr>
                     </a:p>
@@ -14976,10 +14969,10 @@
                     <a:p>
                       <a:pPr fontAlgn="base"/>
                       <a:r>
-                        <a:rPr lang="en-US" sz="1400"/>
-                        <a:t>2</a:t>
-                      </a:r>
-                      <a:endParaRPr lang="en-US" sz="1400">
+                        <a:rPr lang="en-US" sz="1400" dirty="0"/>
+                        <a:t>5</a:t>
+                      </a:r>
+                      <a:endParaRPr lang="en-US" sz="1400" dirty="0">
                         <a:effectLst/>
                       </a:endParaRPr>
                     </a:p>
@@ -14993,10 +14986,10 @@
                     <a:p>
                       <a:pPr fontAlgn="base"/>
                       <a:r>
-                        <a:rPr lang="en-US" sz="1400"/>
-                        <a:t>6</a:t>
-                      </a:r>
-                      <a:endParaRPr lang="en-US" sz="1400">
+                        <a:rPr lang="en-US" sz="1400" dirty="0"/>
+                        <a:t>1,2,3,4,5,6</a:t>
+                      </a:r>
+                      <a:endParaRPr lang="en-US" sz="1400" dirty="0">
                         <a:effectLst/>
                       </a:endParaRPr>
                     </a:p>
@@ -15067,12 +15060,11 @@
                         <a:buNone/>
                       </a:pPr>
                       <a:r>
-                        <a:rPr lang="en-US" sz="1400"/>
+                        <a:rPr lang="en-US" sz="1400" dirty="0">
+                          <a:effectLst/>
+                        </a:rPr>
                         <a:t>7</a:t>
                       </a:r>
-                      <a:endParaRPr lang="en-US" sz="1400">
-                        <a:effectLst/>
-                      </a:endParaRPr>
                     </a:p>
                   </a:txBody>
                   <a:tcPr anchor="ctr"/>

</xml_diff>